<commit_message>
vyměněno staré logo za nové v prezentaci
</commit_message>
<xml_diff>
--- a/šablony/prezentace/Prezentace GJK.pptx
+++ b/šablony/prezentace/Prezentace GJK.pptx
@@ -5745,37 +5745,9 @@
           </a:p>
         </p:txBody>
       </p:sp>
-      <p:pic>
-        <p:nvPicPr>
-          <p:cNvPr id="9" name="Google Shape;9;p1"/>
-          <p:cNvPicPr preferRelativeResize="0"/>
-          <p:nvPr/>
-        </p:nvPicPr>
-        <p:blipFill>
-          <a:blip r:embed="rId1">
-            <a:alphaModFix/>
-          </a:blip>
-          <a:stretch>
-            <a:fillRect/>
-          </a:stretch>
-        </p:blipFill>
-        <p:spPr>
-          <a:xfrm>
-            <a:off x="0" y="4441075"/>
-            <a:ext cx="2011375" cy="702425"/>
-          </a:xfrm>
-          <a:prstGeom prst="rect">
-            <a:avLst/>
-          </a:prstGeom>
-          <a:noFill/>
-          <a:ln>
-            <a:noFill/>
-          </a:ln>
-        </p:spPr>
-      </p:pic>
       <p:cxnSp>
         <p:nvCxnSpPr>
-          <p:cNvPr id="10" name="Google Shape;10;p1"/>
+          <p:cNvPr id="9" name="Google Shape;9;p1"/>
           <p:cNvCxnSpPr/>
           <p:nvPr/>
         </p:nvCxnSpPr>
@@ -5799,6 +5771,34 @@
           </a:ln>
         </p:spPr>
       </p:cxnSp>
+      <p:pic>
+        <p:nvPicPr>
+          <p:cNvPr id="10" name="Google Shape;10;p1"/>
+          <p:cNvPicPr preferRelativeResize="0"/>
+          <p:nvPr/>
+        </p:nvPicPr>
+        <p:blipFill>
+          <a:blip r:embed="rId1">
+            <a:alphaModFix/>
+          </a:blip>
+          <a:stretch>
+            <a:fillRect/>
+          </a:stretch>
+        </p:blipFill>
+        <p:spPr>
+          <a:xfrm>
+            <a:off x="0" y="4441083"/>
+            <a:ext cx="2011375" cy="702434"/>
+          </a:xfrm>
+          <a:prstGeom prst="rect">
+            <a:avLst/>
+          </a:prstGeom>
+          <a:noFill/>
+          <a:ln>
+            <a:noFill/>
+          </a:ln>
+        </p:spPr>
+      </p:pic>
     </p:spTree>
   </p:cSld>
   <p:clrMap accent1="accent1" accent2="accent2" accent3="accent3" accent4="accent4" accent5="accent5" accent6="accent6" bg1="lt1" bg2="dk2" tx1="dk1" tx2="lt2" folHlink="folHlink" hlink="hlink"/>

</xml_diff>